<commit_message>
New files and 2018
</commit_message>
<xml_diff>
--- a/Documents for Progress/topTagger_MassFit3Regions_22Oct2019.pptx
+++ b/Documents for Progress/topTagger_MassFit3Regions_22Oct2019.pptx
@@ -19,8 +19,8 @@
     <p:sldId id="450" r:id="rId7"/>
     <p:sldId id="451" r:id="rId8"/>
     <p:sldId id="452" r:id="rId9"/>
-    <p:sldId id="453" r:id="rId10"/>
-    <p:sldId id="455" r:id="rId11"/>
+    <p:sldId id="455" r:id="rId10"/>
+    <p:sldId id="453" r:id="rId11"/>
   </p:sldIdLst>
   <p:sldSz cx="12192000" cy="6858000"/>
   <p:notesSz cx="6858000" cy="9144000"/>
@@ -212,7 +212,7 @@
           <a:p>
             <a:fld id="{0DAA3570-B70D-4A9F-9B63-1659E97590CB}" type="datetime1">
               <a:rPr lang="en-GB" smtClean="0"/>
-              <a:t>24/10/2019</a:t>
+              <a:t>25/10/2019</a:t>
             </a:fld>
             <a:endParaRPr lang="en-GB"/>
           </a:p>
@@ -418,7 +418,7 @@
           <a:p>
             <a:fld id="{E1E1338F-B435-4DF6-9AE3-7F65274EBD0A}" type="datetime1">
               <a:rPr lang="en-GB" smtClean="0"/>
-              <a:t>24/10/2019</a:t>
+              <a:t>25/10/2019</a:t>
             </a:fld>
             <a:endParaRPr lang="en-GB"/>
           </a:p>
@@ -752,7 +752,7 @@
           <a:p>
             <a:fld id="{0D7E851C-70F9-4D76-BF3E-4E54C77E096E}" type="datetime1">
               <a:rPr lang="en-GB" smtClean="0"/>
-              <a:t>24/10/2019</a:t>
+              <a:t>25/10/2019</a:t>
             </a:fld>
             <a:endParaRPr lang="en-GB"/>
           </a:p>
@@ -1020,7 +1020,7 @@
           <a:p>
             <a:fld id="{6F70CC3F-F4F0-46BB-A868-7CB1CC7F36E9}" type="datetime1">
               <a:rPr lang="en-US" smtClean="0"/>
-              <a:t>10/24/19</a:t>
+              <a:t>10/25/19</a:t>
             </a:fld>
             <a:endParaRPr lang="en-US" dirty="0"/>
           </a:p>
@@ -1227,7 +1227,7 @@
           <a:p>
             <a:fld id="{C6B24137-F447-45C5-ADDB-1DEE88B977EB}" type="datetime1">
               <a:rPr lang="en-US" smtClean="0"/>
-              <a:t>10/24/19</a:t>
+              <a:t>10/25/19</a:t>
             </a:fld>
             <a:endParaRPr lang="en-US" dirty="0"/>
           </a:p>
@@ -1482,7 +1482,7 @@
           <a:p>
             <a:fld id="{A2452AD9-823E-445A-8840-DE1BA1407B0F}" type="datetime1">
               <a:rPr lang="en-US" smtClean="0"/>
-              <a:t>10/24/19</a:t>
+              <a:t>10/25/19</a:t>
             </a:fld>
             <a:endParaRPr lang="en-US" dirty="0"/>
           </a:p>
@@ -1673,7 +1673,7 @@
           <a:p>
             <a:fld id="{9D34335A-3586-434F-9D39-96B67E9D14E2}" type="datetime1">
               <a:rPr lang="en-US" smtClean="0"/>
-              <a:t>10/24/19</a:t>
+              <a:t>10/25/19</a:t>
             </a:fld>
             <a:endParaRPr lang="en-GB"/>
           </a:p>
@@ -1847,7 +1847,7 @@
           <a:p>
             <a:fld id="{38A3CDD1-24B3-4A83-94EC-BCABDEEF598E}" type="datetime1">
               <a:rPr lang="en-US" smtClean="0"/>
-              <a:t>10/24/19</a:t>
+              <a:t>10/25/19</a:t>
             </a:fld>
             <a:endParaRPr lang="en-GB"/>
           </a:p>
@@ -2097,7 +2097,7 @@
           <a:p>
             <a:fld id="{B598D5C6-59D9-4809-8643-02288EDFD862}" type="datetime1">
               <a:rPr lang="en-US" smtClean="0"/>
-              <a:t>10/24/19</a:t>
+              <a:t>10/25/19</a:t>
             </a:fld>
             <a:endParaRPr lang="en-GB"/>
           </a:p>
@@ -2333,7 +2333,7 @@
           <a:p>
             <a:fld id="{E8C49333-08CE-4959-8B20-6FFDB2AD2CE3}" type="datetime1">
               <a:rPr lang="en-US" smtClean="0"/>
-              <a:t>10/24/19</a:t>
+              <a:t>10/25/19</a:t>
             </a:fld>
             <a:endParaRPr lang="en-GB"/>
           </a:p>
@@ -2704,7 +2704,7 @@
           <a:p>
             <a:fld id="{A0244BB5-59A9-43D2-B40B-9C4DD1D9E810}" type="datetime1">
               <a:rPr lang="en-US" smtClean="0"/>
-              <a:t>10/24/19</a:t>
+              <a:t>10/25/19</a:t>
             </a:fld>
             <a:endParaRPr lang="en-GB"/>
           </a:p>
@@ -2826,7 +2826,7 @@
           <a:p>
             <a:fld id="{C52C7BD1-B5E6-431A-949E-151D673733DD}" type="datetime1">
               <a:rPr lang="en-US" smtClean="0"/>
-              <a:t>10/24/19</a:t>
+              <a:t>10/25/19</a:t>
             </a:fld>
             <a:endParaRPr lang="en-GB"/>
           </a:p>
@@ -2925,7 +2925,7 @@
           <a:p>
             <a:fld id="{383ACACC-B893-415F-8470-0AF677E741A8}" type="datetime1">
               <a:rPr lang="en-US" smtClean="0"/>
-              <a:t>10/24/19</a:t>
+              <a:t>10/25/19</a:t>
             </a:fld>
             <a:endParaRPr lang="en-GB"/>
           </a:p>
@@ -3206,7 +3206,7 @@
           <a:p>
             <a:fld id="{92C1EBAD-8585-4EAE-9D47-B8800D8018AA}" type="datetime1">
               <a:rPr lang="en-US" smtClean="0"/>
-              <a:t>10/24/19</a:t>
+              <a:t>10/25/19</a:t>
             </a:fld>
             <a:endParaRPr lang="en-GB"/>
           </a:p>
@@ -3362,7 +3362,7 @@
           <a:p>
             <a:fld id="{B8FDFAE3-A6AC-47F4-9F09-6BE9C0C0FB13}" type="datetime1">
               <a:rPr lang="en-US" smtClean="0"/>
-              <a:t>10/24/19</a:t>
+              <a:t>10/25/19</a:t>
             </a:fld>
             <a:endParaRPr lang="en-US" dirty="0"/>
           </a:p>
@@ -3643,7 +3643,7 @@
           <a:p>
             <a:fld id="{F64BBFAD-599D-4F86-B35F-B5DD90EE8D1C}" type="datetime1">
               <a:rPr lang="en-US" smtClean="0"/>
-              <a:t>10/24/19</a:t>
+              <a:t>10/25/19</a:t>
             </a:fld>
             <a:endParaRPr lang="en-GB"/>
           </a:p>
@@ -3817,7 +3817,7 @@
           <a:p>
             <a:fld id="{09A4C386-343A-4915-B90D-A61E2789050B}" type="datetime1">
               <a:rPr lang="en-US" smtClean="0"/>
-              <a:t>10/24/19</a:t>
+              <a:t>10/25/19</a:t>
             </a:fld>
             <a:endParaRPr lang="en-GB"/>
           </a:p>
@@ -4001,7 +4001,7 @@
           <a:p>
             <a:fld id="{68633DEC-0070-4E4F-9FB5-5650E1E5BE04}" type="datetime1">
               <a:rPr lang="en-US" smtClean="0"/>
-              <a:t>10/24/19</a:t>
+              <a:t>10/25/19</a:t>
             </a:fld>
             <a:endParaRPr lang="en-GB"/>
           </a:p>
@@ -4348,7 +4348,7 @@
           <a:p>
             <a:fld id="{627CEB96-F060-4BD0-A319-7DDBAD2330C7}" type="datetime1">
               <a:rPr lang="en-US" smtClean="0"/>
-              <a:t>10/24/19</a:t>
+              <a:t>10/25/19</a:t>
             </a:fld>
             <a:endParaRPr lang="en-US" dirty="0"/>
           </a:p>
@@ -4622,7 +4622,7 @@
           <a:p>
             <a:fld id="{544EC976-2A06-42F2-83D5-727A07C4432D}" type="datetime1">
               <a:rPr lang="en-US" smtClean="0"/>
-              <a:t>10/24/19</a:t>
+              <a:t>10/25/19</a:t>
             </a:fld>
             <a:endParaRPr lang="en-US" dirty="0"/>
           </a:p>
@@ -5000,7 +5000,7 @@
           <a:p>
             <a:fld id="{5AA39BAF-3515-4BA9-8721-0FD7C068E6CE}" type="datetime1">
               <a:rPr lang="en-US" smtClean="0"/>
-              <a:t>10/24/19</a:t>
+              <a:t>10/25/19</a:t>
             </a:fld>
             <a:endParaRPr lang="en-US" dirty="0"/>
           </a:p>
@@ -5117,7 +5117,7 @@
           <a:p>
             <a:fld id="{0BD7B019-E4B6-436B-9882-A2B77EE70AF1}" type="datetime1">
               <a:rPr lang="en-US" smtClean="0"/>
-              <a:t>10/24/19</a:t>
+              <a:t>10/25/19</a:t>
             </a:fld>
             <a:endParaRPr lang="en-US" dirty="0"/>
           </a:p>
@@ -5287,7 +5287,7 @@
           <a:p>
             <a:fld id="{91BE9073-E7C2-4887-95DE-832592E46858}" type="datetime1">
               <a:rPr lang="en-US" smtClean="0"/>
-              <a:t>10/24/19</a:t>
+              <a:t>10/25/19</a:t>
             </a:fld>
             <a:endParaRPr lang="en-US" dirty="0"/>
           </a:p>
@@ -5670,7 +5670,7 @@
           <a:p>
             <a:fld id="{00392B4E-FEAF-42BF-8CB0-15FC260E7913}" type="datetime1">
               <a:rPr lang="en-US" smtClean="0"/>
-              <a:t>10/24/19</a:t>
+              <a:t>10/25/19</a:t>
             </a:fld>
             <a:endParaRPr lang="en-US" dirty="0"/>
           </a:p>
@@ -6052,7 +6052,7 @@
           <a:p>
             <a:fld id="{572BCF8B-3E8E-431D-82BE-9E44782EED80}" type="datetime1">
               <a:rPr lang="en-US" smtClean="0"/>
-              <a:t>10/24/19</a:t>
+              <a:t>10/25/19</a:t>
             </a:fld>
             <a:endParaRPr lang="en-US" dirty="0"/>
           </a:p>
@@ -6337,7 +6337,7 @@
           <a:p>
             <a:fld id="{E36859CF-2FA5-4ECD-B70A-458D3733E031}" type="datetime1">
               <a:rPr lang="en-US" smtClean="0"/>
-              <a:t>10/24/19</a:t>
+              <a:t>10/25/19</a:t>
             </a:fld>
             <a:endParaRPr lang="en-US" dirty="0"/>
           </a:p>
@@ -7027,7 +7027,7 @@
           <a:p>
             <a:fld id="{9B0C0037-87E8-4271-BAB8-7377F3CDBABC}" type="datetime1">
               <a:rPr lang="en-US" smtClean="0"/>
-              <a:t>10/24/19</a:t>
+              <a:t>10/25/19</a:t>
             </a:fld>
             <a:endParaRPr lang="en-GB"/>
           </a:p>
@@ -12378,217 +12378,6 @@
         <p:spPr>
           <a:xfrm>
             <a:off x="1" y="1255993"/>
-            <a:ext cx="2664142" cy="1384995"/>
-          </a:xfrm>
-          <a:prstGeom prst="rect">
-            <a:avLst/>
-          </a:prstGeom>
-          <a:noFill/>
-        </p:spPr>
-        <p:txBody>
-          <a:bodyPr wrap="square" rtlCol="0">
-            <a:spAutoFit/>
-          </a:bodyPr>
-          <a:lstStyle/>
-          <a:p>
-            <a:r>
-              <a:rPr lang="en-US" sz="2800" u="sng" dirty="0"/>
-              <a:t>b-tagging </a:t>
-            </a:r>
-          </a:p>
-          <a:p>
-            <a:r>
-              <a:rPr lang="en-US" sz="2800" u="sng" dirty="0"/>
-              <a:t>Efficiency</a:t>
-            </a:r>
-          </a:p>
-          <a:p>
-            <a:endParaRPr lang="en-US" sz="2800" u="sng" dirty="0"/>
-          </a:p>
-        </p:txBody>
-      </p:sp>
-      <p:pic>
-        <p:nvPicPr>
-          <p:cNvPr id="4" name="Picture 3">
-            <a:extLst>
-              <a:ext uri="{FF2B5EF4-FFF2-40B4-BE49-F238E27FC236}">
-                <a16:creationId xmlns:a16="http://schemas.microsoft.com/office/drawing/2014/main" id="{E199375C-D602-2749-90A1-42544CA019BC}"/>
-              </a:ext>
-            </a:extLst>
-          </p:cNvPr>
-          <p:cNvPicPr>
-            <a:picLocks noChangeAspect="1"/>
-          </p:cNvPicPr>
-          <p:nvPr/>
-        </p:nvPicPr>
-        <p:blipFill>
-          <a:blip r:embed="rId2"/>
-          <a:stretch>
-            <a:fillRect/>
-          </a:stretch>
-        </p:blipFill>
-        <p:spPr>
-          <a:xfrm rot="5400000">
-            <a:off x="3081972" y="-632079"/>
-            <a:ext cx="3272409" cy="4536567"/>
-          </a:xfrm>
-          <a:prstGeom prst="rect">
-            <a:avLst/>
-          </a:prstGeom>
-        </p:spPr>
-      </p:pic>
-      <p:pic>
-        <p:nvPicPr>
-          <p:cNvPr id="8" name="Picture 7">
-            <a:extLst>
-              <a:ext uri="{FF2B5EF4-FFF2-40B4-BE49-F238E27FC236}">
-                <a16:creationId xmlns:a16="http://schemas.microsoft.com/office/drawing/2014/main" id="{21BCEC0E-8A15-BE4B-9C89-C3D144EE94ED}"/>
-              </a:ext>
-            </a:extLst>
-          </p:cNvPr>
-          <p:cNvPicPr>
-            <a:picLocks noChangeAspect="1"/>
-          </p:cNvPicPr>
-          <p:nvPr/>
-        </p:nvPicPr>
-        <p:blipFill>
-          <a:blip r:embed="rId3"/>
-          <a:stretch>
-            <a:fillRect/>
-          </a:stretch>
-        </p:blipFill>
-        <p:spPr>
-          <a:xfrm rot="5400000">
-            <a:off x="8105902" y="-475488"/>
-            <a:ext cx="3272409" cy="4536567"/>
-          </a:xfrm>
-          <a:prstGeom prst="rect">
-            <a:avLst/>
-          </a:prstGeom>
-        </p:spPr>
-      </p:pic>
-      <p:pic>
-        <p:nvPicPr>
-          <p:cNvPr id="11" name="Picture 10">
-            <a:extLst>
-              <a:ext uri="{FF2B5EF4-FFF2-40B4-BE49-F238E27FC236}">
-                <a16:creationId xmlns:a16="http://schemas.microsoft.com/office/drawing/2014/main" id="{78AEFDDA-C3CC-7A4C-B757-77EE239F9923}"/>
-              </a:ext>
-            </a:extLst>
-          </p:cNvPr>
-          <p:cNvPicPr>
-            <a:picLocks noChangeAspect="1"/>
-          </p:cNvPicPr>
-          <p:nvPr/>
-        </p:nvPicPr>
-        <p:blipFill>
-          <a:blip r:embed="rId4"/>
-          <a:stretch>
-            <a:fillRect/>
-          </a:stretch>
-        </p:blipFill>
-        <p:spPr>
-          <a:xfrm rot="5400000">
-            <a:off x="8105902" y="2640330"/>
-            <a:ext cx="3272409" cy="4536567"/>
-          </a:xfrm>
-          <a:prstGeom prst="rect">
-            <a:avLst/>
-          </a:prstGeom>
-        </p:spPr>
-      </p:pic>
-      <p:pic>
-        <p:nvPicPr>
-          <p:cNvPr id="14" name="Picture 13">
-            <a:extLst>
-              <a:ext uri="{FF2B5EF4-FFF2-40B4-BE49-F238E27FC236}">
-                <a16:creationId xmlns:a16="http://schemas.microsoft.com/office/drawing/2014/main" id="{29362B00-3C6F-234D-8A0F-A81DABB65AFB}"/>
-              </a:ext>
-            </a:extLst>
-          </p:cNvPr>
-          <p:cNvPicPr>
-            <a:picLocks noChangeAspect="1"/>
-          </p:cNvPicPr>
-          <p:nvPr/>
-        </p:nvPicPr>
-        <p:blipFill>
-          <a:blip r:embed="rId5"/>
-          <a:stretch>
-            <a:fillRect/>
-          </a:stretch>
-        </p:blipFill>
-        <p:spPr>
-          <a:xfrm rot="5400000">
-            <a:off x="3081971" y="2640329"/>
-            <a:ext cx="3272409" cy="4536567"/>
-          </a:xfrm>
-          <a:prstGeom prst="rect">
-            <a:avLst/>
-          </a:prstGeom>
-        </p:spPr>
-      </p:pic>
-    </p:spTree>
-    <p:extLst>
-      <p:ext uri="{BB962C8B-B14F-4D97-AF65-F5344CB8AC3E}">
-        <p14:creationId xmlns:p14="http://schemas.microsoft.com/office/powerpoint/2010/main" val="3842861855"/>
-      </p:ext>
-    </p:extLst>
-  </p:cSld>
-  <p:clrMapOvr>
-    <a:masterClrMapping/>
-  </p:clrMapOvr>
-</p:sld>
-</file>
-
-<file path=ppt/slides/slide9.xml><?xml version="1.0" encoding="utf-8"?>
-<p:sld xmlns:a="http://schemas.openxmlformats.org/drawingml/2006/main" xmlns:r="http://schemas.openxmlformats.org/officeDocument/2006/relationships" xmlns:p="http://schemas.openxmlformats.org/presentationml/2006/main">
-  <p:cSld>
-    <p:spTree>
-      <p:nvGrpSpPr>
-        <p:cNvPr id="1" name=""/>
-        <p:cNvGrpSpPr/>
-        <p:nvPr/>
-      </p:nvGrpSpPr>
-      <p:grpSpPr>
-        <a:xfrm>
-          <a:off x="0" y="0"/>
-          <a:ext cx="0" cy="0"/>
-          <a:chOff x="0" y="0"/>
-          <a:chExt cx="0" cy="0"/>
-        </a:xfrm>
-      </p:grpSpPr>
-      <p:sp>
-        <p:nvSpPr>
-          <p:cNvPr id="3" name="Footer Placeholder 2"/>
-          <p:cNvSpPr>
-            <a:spLocks noGrp="1"/>
-          </p:cNvSpPr>
-          <p:nvPr>
-            <p:ph type="ftr" sz="quarter" idx="11"/>
-          </p:nvPr>
-        </p:nvSpPr>
-        <p:spPr/>
-        <p:txBody>
-          <a:bodyPr/>
-          <a:lstStyle/>
-          <a:p>
-            <a:r>
-              <a:rPr lang="fi-FI"/>
-              <a:t>NTUA G. Bakas, I. Papakrivopoulos</a:t>
-            </a:r>
-            <a:endParaRPr lang="en-US" dirty="0"/>
-          </a:p>
-        </p:txBody>
-      </p:sp>
-      <p:sp>
-        <p:nvSpPr>
-          <p:cNvPr id="7" name="TextBox 6"/>
-          <p:cNvSpPr txBox="1"/>
-          <p:nvPr/>
-        </p:nvSpPr>
-        <p:spPr>
-          <a:xfrm>
-            <a:off x="1" y="1255993"/>
             <a:ext cx="2664142" cy="954107"/>
           </a:xfrm>
           <a:prstGeom prst="rect">
@@ -12646,6 +12435,217 @@
     <p:extLst>
       <p:ext uri="{BB962C8B-B14F-4D97-AF65-F5344CB8AC3E}">
         <p14:creationId xmlns:p14="http://schemas.microsoft.com/office/powerpoint/2010/main" val="3632090195"/>
+      </p:ext>
+    </p:extLst>
+  </p:cSld>
+  <p:clrMapOvr>
+    <a:masterClrMapping/>
+  </p:clrMapOvr>
+</p:sld>
+</file>
+
+<file path=ppt/slides/slide9.xml><?xml version="1.0" encoding="utf-8"?>
+<p:sld xmlns:a="http://schemas.openxmlformats.org/drawingml/2006/main" xmlns:r="http://schemas.openxmlformats.org/officeDocument/2006/relationships" xmlns:p="http://schemas.openxmlformats.org/presentationml/2006/main">
+  <p:cSld>
+    <p:spTree>
+      <p:nvGrpSpPr>
+        <p:cNvPr id="1" name=""/>
+        <p:cNvGrpSpPr/>
+        <p:nvPr/>
+      </p:nvGrpSpPr>
+      <p:grpSpPr>
+        <a:xfrm>
+          <a:off x="0" y="0"/>
+          <a:ext cx="0" cy="0"/>
+          <a:chOff x="0" y="0"/>
+          <a:chExt cx="0" cy="0"/>
+        </a:xfrm>
+      </p:grpSpPr>
+      <p:sp>
+        <p:nvSpPr>
+          <p:cNvPr id="3" name="Footer Placeholder 2"/>
+          <p:cNvSpPr>
+            <a:spLocks noGrp="1"/>
+          </p:cNvSpPr>
+          <p:nvPr>
+            <p:ph type="ftr" sz="quarter" idx="11"/>
+          </p:nvPr>
+        </p:nvSpPr>
+        <p:spPr/>
+        <p:txBody>
+          <a:bodyPr/>
+          <a:lstStyle/>
+          <a:p>
+            <a:r>
+              <a:rPr lang="fi-FI"/>
+              <a:t>NTUA G. Bakas, I. Papakrivopoulos</a:t>
+            </a:r>
+            <a:endParaRPr lang="en-US" dirty="0"/>
+          </a:p>
+        </p:txBody>
+      </p:sp>
+      <p:sp>
+        <p:nvSpPr>
+          <p:cNvPr id="7" name="TextBox 6"/>
+          <p:cNvSpPr txBox="1"/>
+          <p:nvPr/>
+        </p:nvSpPr>
+        <p:spPr>
+          <a:xfrm>
+            <a:off x="1" y="1255993"/>
+            <a:ext cx="2664142" cy="1384995"/>
+          </a:xfrm>
+          <a:prstGeom prst="rect">
+            <a:avLst/>
+          </a:prstGeom>
+          <a:noFill/>
+        </p:spPr>
+        <p:txBody>
+          <a:bodyPr wrap="square" rtlCol="0">
+            <a:spAutoFit/>
+          </a:bodyPr>
+          <a:lstStyle/>
+          <a:p>
+            <a:r>
+              <a:rPr lang="en-US" sz="2800" u="sng" dirty="0"/>
+              <a:t>b-tagging </a:t>
+            </a:r>
+          </a:p>
+          <a:p>
+            <a:r>
+              <a:rPr lang="en-US" sz="2800" u="sng" dirty="0"/>
+              <a:t>Efficiency</a:t>
+            </a:r>
+          </a:p>
+          <a:p>
+            <a:endParaRPr lang="en-US" sz="2800" u="sng" dirty="0"/>
+          </a:p>
+        </p:txBody>
+      </p:sp>
+      <p:pic>
+        <p:nvPicPr>
+          <p:cNvPr id="5" name="Picture 4">
+            <a:extLst>
+              <a:ext uri="{FF2B5EF4-FFF2-40B4-BE49-F238E27FC236}">
+                <a16:creationId xmlns:a16="http://schemas.microsoft.com/office/drawing/2014/main" id="{097B2D73-4F98-9E46-A3A4-064EEB72D7C6}"/>
+              </a:ext>
+            </a:extLst>
+          </p:cNvPr>
+          <p:cNvPicPr>
+            <a:picLocks noChangeAspect="1"/>
+          </p:cNvPicPr>
+          <p:nvPr/>
+        </p:nvPicPr>
+        <p:blipFill>
+          <a:blip r:embed="rId2"/>
+          <a:stretch>
+            <a:fillRect/>
+          </a:stretch>
+        </p:blipFill>
+        <p:spPr>
+          <a:xfrm rot="5400000">
+            <a:off x="2972144" y="-563500"/>
+            <a:ext cx="3116580" cy="4320540"/>
+          </a:xfrm>
+          <a:prstGeom prst="rect">
+            <a:avLst/>
+          </a:prstGeom>
+        </p:spPr>
+      </p:pic>
+      <p:pic>
+        <p:nvPicPr>
+          <p:cNvPr id="9" name="Picture 8">
+            <a:extLst>
+              <a:ext uri="{FF2B5EF4-FFF2-40B4-BE49-F238E27FC236}">
+                <a16:creationId xmlns:a16="http://schemas.microsoft.com/office/drawing/2014/main" id="{933B42FC-AC1F-E546-968E-7DA0DADE8243}"/>
+              </a:ext>
+            </a:extLst>
+          </p:cNvPr>
+          <p:cNvPicPr>
+            <a:picLocks noChangeAspect="1"/>
+          </p:cNvPicPr>
+          <p:nvPr/>
+        </p:nvPicPr>
+        <p:blipFill>
+          <a:blip r:embed="rId3"/>
+          <a:stretch>
+            <a:fillRect/>
+          </a:stretch>
+        </p:blipFill>
+        <p:spPr>
+          <a:xfrm rot="5400000">
+            <a:off x="7470884" y="-563500"/>
+            <a:ext cx="3116580" cy="4320540"/>
+          </a:xfrm>
+          <a:prstGeom prst="rect">
+            <a:avLst/>
+          </a:prstGeom>
+        </p:spPr>
+      </p:pic>
+      <p:pic>
+        <p:nvPicPr>
+          <p:cNvPr id="12" name="Picture 11">
+            <a:extLst>
+              <a:ext uri="{FF2B5EF4-FFF2-40B4-BE49-F238E27FC236}">
+                <a16:creationId xmlns:a16="http://schemas.microsoft.com/office/drawing/2014/main" id="{B5CE552A-FB21-FB49-94D4-B5ECF11E4143}"/>
+              </a:ext>
+            </a:extLst>
+          </p:cNvPr>
+          <p:cNvPicPr>
+            <a:picLocks noChangeAspect="1"/>
+          </p:cNvPicPr>
+          <p:nvPr/>
+        </p:nvPicPr>
+        <p:blipFill>
+          <a:blip r:embed="rId4"/>
+          <a:stretch>
+            <a:fillRect/>
+          </a:stretch>
+        </p:blipFill>
+        <p:spPr>
+          <a:xfrm rot="5400000">
+            <a:off x="7470884" y="2537460"/>
+            <a:ext cx="3116580" cy="4320540"/>
+          </a:xfrm>
+          <a:prstGeom prst="rect">
+            <a:avLst/>
+          </a:prstGeom>
+        </p:spPr>
+      </p:pic>
+      <p:pic>
+        <p:nvPicPr>
+          <p:cNvPr id="15" name="Picture 14">
+            <a:extLst>
+              <a:ext uri="{FF2B5EF4-FFF2-40B4-BE49-F238E27FC236}">
+                <a16:creationId xmlns:a16="http://schemas.microsoft.com/office/drawing/2014/main" id="{0EAA8EAC-7A95-C14D-A175-8B8FC9C10BA9}"/>
+              </a:ext>
+            </a:extLst>
+          </p:cNvPr>
+          <p:cNvPicPr>
+            <a:picLocks noChangeAspect="1"/>
+          </p:cNvPicPr>
+          <p:nvPr/>
+        </p:nvPicPr>
+        <p:blipFill>
+          <a:blip r:embed="rId5"/>
+          <a:stretch>
+            <a:fillRect/>
+          </a:stretch>
+        </p:blipFill>
+        <p:spPr>
+          <a:xfrm rot="5400000">
+            <a:off x="2972144" y="2537460"/>
+            <a:ext cx="3116580" cy="4320540"/>
+          </a:xfrm>
+          <a:prstGeom prst="rect">
+            <a:avLst/>
+          </a:prstGeom>
+        </p:spPr>
+      </p:pic>
+    </p:spTree>
+    <p:extLst>
+      <p:ext uri="{BB962C8B-B14F-4D97-AF65-F5344CB8AC3E}">
+        <p14:creationId xmlns:p14="http://schemas.microsoft.com/office/powerpoint/2010/main" val="3842861855"/>
       </p:ext>
     </p:extLst>
   </p:cSld>

</xml_diff>